<commit_message>
some changes to the repport and a beginning of the powerpoint presentation
</commit_message>
<xml_diff>
--- a/Documents/Simulation of FCC monocrystals.pptx
+++ b/Documents/Simulation of FCC monocrystals.pptx
@@ -4619,7 +4619,13 @@
           <p:cNvGraphicFramePr>
             <a:graphicFrameLocks noGrp="1"/>
           </p:cNvGraphicFramePr>
-          <p:nvPr/>
+          <p:nvPr>
+            <p:extLst>
+              <p:ext uri="{D42A27DB-BD31-4B8C-83A1-F6EECF244321}">
+                <p14:modId xmlns:p14="http://schemas.microsoft.com/office/powerpoint/2010/main" val="976674383"/>
+              </p:ext>
+            </p:extLst>
+          </p:nvPr>
         </p:nvGraphicFramePr>
         <p:xfrm>
           <a:off x="1622425" y="3443288"/>
@@ -4652,12 +4658,12 @@
                         </a:spcAft>
                       </a:pPr>
                       <a:r>
-                        <a:rPr lang="en-US" sz="1100" kern="150">
+                        <a:rPr lang="en-US" sz="1100" kern="150" dirty="0">
                           <a:effectLst/>
                         </a:rPr>
                         <a:t>Element</a:t>
                       </a:r>
-                      <a:endParaRPr lang="en-US" sz="1200" kern="150">
+                      <a:endParaRPr lang="en-US" sz="1200" kern="150" dirty="0">
                         <a:effectLst/>
                         <a:latin typeface="Times New Roman"/>
                         <a:ea typeface="Microsoft YaHei"/>
@@ -4828,7 +4834,7 @@
                         </a:spcAft>
                       </a:pPr>
                       <a:r>
-                        <a:rPr lang="en-US" sz="1100" kern="150">
+                        <a:rPr lang="en-US" sz="1100" kern="150" smtClean="0">
                           <a:effectLst/>
                         </a:rPr>
                         <a:t>2.86</a:t>

</xml_diff>